<commit_message>
[master] added last lesson
</commit_message>
<xml_diff>
--- a/lab_12-symposium/lab_12-symposium.pptx
+++ b/lab_12-symposium/lab_12-symposium.pptx
@@ -4243,14 +4243,25 @@
               <a:rPr lang="en-US" sz="2400" b="0" dirty="0">
                 <a:latin typeface="Palatino Linotype" panose="02040502050505030304" pitchFamily="18" charset="0"/>
               </a:rPr>
-              <a:t>consume per min (l/min)</a:t>
-            </a:r>
-            <a:r>
-              <a:rPr lang="en-US" dirty="0">
+              <a:t>consume per min (l/min</a:t>
+            </a:r>
+            <a:r>
+              <a:rPr lang="en-US" sz="2400" b="0">
+                <a:latin typeface="Palatino Linotype" panose="02040502050505030304" pitchFamily="18" charset="0"/>
+              </a:rPr>
+              <a:t>)</a:t>
+            </a:r>
+            <a:r>
+              <a:rPr lang="en-US">
                 <a:latin typeface="Palatino Linotype" panose="02040502050505030304" pitchFamily="18" charset="0"/>
               </a:rPr>
               <a:t>. </a:t>
             </a:r>
+          </a:p>
+          <a:p>
+            <a:pPr marL="0" indent="0">
+              <a:buNone/>
+            </a:pPr>
             <a:endParaRPr lang="en-US" sz="2400" b="0" dirty="0"/>
           </a:p>
           <a:p>

</xml_diff>